<commit_message>
Refactor house prices regresion model
</commit_message>
<xml_diff>
--- a/layers/Case Study_Analyzing House Price Data with Machine Learning.pptx
+++ b/layers/Case Study_Analyzing House Price Data with Machine Learning.pptx
@@ -24599,13 +24599,22 @@
               </a:spcAft>
             </a:pPr>
             <a:r>
+              <a:rPr lang="en-US" sz="1200" b="1">
+                <a:solidFill>
+                  <a:schemeClr val="tx1"/>
+                </a:solidFill>
+                <a:latin typeface="+mj-lt"/>
+              </a:rPr>
+              <a:t>Feature </a:t>
+            </a:r>
+            <a:r>
               <a:rPr lang="en-US" sz="1200" b="1" dirty="0">
                 <a:solidFill>
                   <a:schemeClr val="tx1"/>
                 </a:solidFill>
                 <a:latin typeface="+mj-lt"/>
               </a:rPr>
-              <a:t>Split Datasets and Feature Engineering.</a:t>
+              <a:t>Engineering.</a:t>
             </a:r>
           </a:p>
           <a:p>
@@ -26761,15 +26770,6 @@
 </file>
 
 <file path=customXml/item2.xml><?xml version="1.0" encoding="utf-8"?>
-<?mso-contentType ?>
-<FormTemplates xmlns="http://schemas.microsoft.com/sharepoint/v3/contenttype/forms">
-  <Display>DocumentLibraryForm</Display>
-  <Edit>DocumentLibraryForm</Edit>
-  <New>DocumentLibraryForm</New>
-</FormTemplates>
-</file>
-
-<file path=customXml/item3.xml><?xml version="1.0" encoding="utf-8"?>
 <p:properties xmlns:p="http://schemas.microsoft.com/office/2006/metadata/properties" xmlns:xsi="http://www.w3.org/2001/XMLSchema-instance" xmlns:pc="http://schemas.microsoft.com/office/infopath/2007/PartnerControls">
   <documentManagement>
     <TaxCatchAll xmlns="7ed3c4da-b135-42a5-aaf8-d0ebc05f566e">
@@ -26799,6 +26799,15 @@
 </p:properties>
 </file>
 
+<file path=customXml/item3.xml><?xml version="1.0" encoding="utf-8"?>
+<?mso-contentType ?>
+<FormTemplates xmlns="http://schemas.microsoft.com/sharepoint/v3/contenttype/forms">
+  <Display>DocumentLibraryForm</Display>
+  <Edit>DocumentLibraryForm</Edit>
+  <New>DocumentLibraryForm</New>
+</FormTemplates>
+</file>
+
 <file path=customXml/itemProps1.xml><?xml version="1.0" encoding="utf-8"?>
 <ds:datastoreItem xmlns:ds="http://schemas.openxmlformats.org/officeDocument/2006/customXml" ds:itemID="{BA890F9F-2984-4E51-ACD7-5DF631C637D9}">
   <ds:schemaRefs>
@@ -26819,14 +26828,6 @@
 </file>
 
 <file path=customXml/itemProps2.xml><?xml version="1.0" encoding="utf-8"?>
-<ds:datastoreItem xmlns:ds="http://schemas.openxmlformats.org/officeDocument/2006/customXml" ds:itemID="{D312BEDD-CD8E-464E-AE20-7BCD0C997533}">
-  <ds:schemaRefs>
-    <ds:schemaRef ds:uri="http://schemas.microsoft.com/sharepoint/v3/contenttype/forms"/>
-  </ds:schemaRefs>
-</ds:datastoreItem>
-</file>
-
-<file path=customXml/itemProps3.xml><?xml version="1.0" encoding="utf-8"?>
 <ds:datastoreItem xmlns:ds="http://schemas.openxmlformats.org/officeDocument/2006/customXml" ds:itemID="{C8EB68D2-3737-4D90-804A-6B964CF8EB88}">
   <ds:schemaRefs>
     <ds:schemaRef ds:uri="http://purl.org/dc/elements/1.1/"/>
@@ -26843,6 +26844,14 @@
 </ds:datastoreItem>
 </file>
 
+<file path=customXml/itemProps3.xml><?xml version="1.0" encoding="utf-8"?>
+<ds:datastoreItem xmlns:ds="http://schemas.openxmlformats.org/officeDocument/2006/customXml" ds:itemID="{D312BEDD-CD8E-464E-AE20-7BCD0C997533}">
+  <ds:schemaRefs>
+    <ds:schemaRef ds:uri="http://schemas.microsoft.com/sharepoint/v3/contenttype/forms"/>
+  </ds:schemaRefs>
+</ds:datastoreItem>
+</file>
+
 <file path=docMetadata/LabelInfo.xml><?xml version="1.0" encoding="utf-8"?>
 <clbl:labelList xmlns:clbl="http://schemas.microsoft.com/office/2020/mipLabelMetadata">
   <clbl:label id="{243bd71d-cef7-442d-b37f-3ff10a3e2832}" enabled="0" method="" siteId="{243bd71d-cef7-442d-b37f-3ff10a3e2832}" removed="1"/>

</xml_diff>

<commit_message>
Scripts and last changes
</commit_message>
<xml_diff>
--- a/layers/Case Study_Analyzing House Price Data with Machine Learning.pptx
+++ b/layers/Case Study_Analyzing House Price Data with Machine Learning.pptx
@@ -28,7 +28,7 @@
       <p:boldItalic r:id="rId15"/>
     </p:embeddedFont>
     <p:embeddedFont>
-      <p:font typeface="Lato Black" panose="020F0502020204030203" pitchFamily="34" charset="0"/>
+      <p:font typeface="Lato Black" panose="020F0A02020204030203" pitchFamily="34" charset="0"/>
       <p:bold r:id="rId16"/>
       <p:italic r:id="rId17"/>
       <p:boldItalic r:id="rId18"/>
@@ -23340,7 +23340,7 @@
         <p:spPr>
           <a:xfrm>
             <a:off x="4867857" y="1865449"/>
-            <a:ext cx="3111939" cy="1661993"/>
+            <a:ext cx="3111939" cy="1179810"/>
           </a:xfrm>
           <a:prstGeom prst="rect">
             <a:avLst/>
@@ -23580,26 +23580,7 @@
                 </a:solidFill>
                 <a:latin typeface="Lato" panose="020F0502020204030203" pitchFamily="34" charset="77"/>
               </a:rPr>
-              <a:t>feature engineering, training, evaluation, and deployment of a model</a:t>
-            </a:r>
-          </a:p>
-          <a:p>
-            <a:pPr defTabSz="685800">
-              <a:lnSpc>
-                <a:spcPct val="100000"/>
-              </a:lnSpc>
-              <a:spcAft>
-                <a:spcPts val="400"/>
-              </a:spcAft>
-            </a:pPr>
-            <a:r>
-              <a:rPr lang="en-US" sz="1400" dirty="0">
-                <a:solidFill>
-                  <a:schemeClr val="tx1"/>
-                </a:solidFill>
-                <a:latin typeface="Lato" panose="020F0502020204030203" pitchFamily="34" charset="77"/>
-              </a:rPr>
-              <a:t>to predict house prices in Hyderabad, India</a:t>
+              <a:t>feature engineering, training, evaluation, and deployment of a model.</a:t>
             </a:r>
           </a:p>
         </p:txBody>
@@ -23618,7 +23599,7 @@
         </p:nvSpPr>
         <p:spPr>
           <a:xfrm>
-            <a:off x="4857461" y="3824913"/>
+            <a:off x="4857464" y="3371056"/>
             <a:ext cx="3111937" cy="913070"/>
           </a:xfrm>
           <a:prstGeom prst="rect">
@@ -23864,7 +23845,7 @@
         <p:spPr>
           <a:xfrm>
             <a:off x="4405023" y="1250444"/>
-            <a:ext cx="48493" cy="3197982"/>
+            <a:ext cx="24246" cy="2454567"/>
           </a:xfrm>
           <a:prstGeom prst="line">
             <a:avLst/>
@@ -23968,7 +23949,7 @@
         </p:nvSpPr>
         <p:spPr>
           <a:xfrm>
-            <a:off x="4262291" y="1865449"/>
+            <a:off x="4262291" y="1976794"/>
             <a:ext cx="333955" cy="333955"/>
           </a:xfrm>
           <a:prstGeom prst="ellipse">
@@ -24032,7 +24013,7 @@
         </p:nvSpPr>
         <p:spPr>
           <a:xfrm>
-            <a:off x="4286538" y="4114471"/>
+            <a:off x="4262291" y="3371056"/>
             <a:ext cx="333955" cy="333955"/>
           </a:xfrm>
           <a:prstGeom prst="ellipse">
@@ -24069,7 +24050,7 @@
           <a:p>
             <a:pPr algn="ctr"/>
             <a:r>
-              <a:rPr lang="en-US" b="1">
+              <a:rPr lang="en-US" b="1" dirty="0">
                 <a:solidFill>
                   <a:schemeClr val="tx1"/>
                 </a:solidFill>
@@ -27374,15 +27355,6 @@
 </file>
 
 <file path=customXml/item2.xml><?xml version="1.0" encoding="utf-8"?>
-<?mso-contentType ?>
-<FormTemplates xmlns="http://schemas.microsoft.com/sharepoint/v3/contenttype/forms">
-  <Display>DocumentLibraryForm</Display>
-  <Edit>DocumentLibraryForm</Edit>
-  <New>DocumentLibraryForm</New>
-</FormTemplates>
-</file>
-
-<file path=customXml/item3.xml><?xml version="1.0" encoding="utf-8"?>
 <p:properties xmlns:p="http://schemas.microsoft.com/office/2006/metadata/properties" xmlns:xsi="http://www.w3.org/2001/XMLSchema-instance" xmlns:pc="http://schemas.microsoft.com/office/infopath/2007/PartnerControls">
   <documentManagement>
     <TaxCatchAll xmlns="7ed3c4da-b135-42a5-aaf8-d0ebc05f566e">
@@ -27412,6 +27384,15 @@
 </p:properties>
 </file>
 
+<file path=customXml/item3.xml><?xml version="1.0" encoding="utf-8"?>
+<?mso-contentType ?>
+<FormTemplates xmlns="http://schemas.microsoft.com/sharepoint/v3/contenttype/forms">
+  <Display>DocumentLibraryForm</Display>
+  <Edit>DocumentLibraryForm</Edit>
+  <New>DocumentLibraryForm</New>
+</FormTemplates>
+</file>
+
 <file path=customXml/itemProps1.xml><?xml version="1.0" encoding="utf-8"?>
 <ds:datastoreItem xmlns:ds="http://schemas.openxmlformats.org/officeDocument/2006/customXml" ds:itemID="{BA890F9F-2984-4E51-ACD7-5DF631C637D9}">
   <ds:schemaRefs>
@@ -27432,14 +27413,6 @@
 </file>
 
 <file path=customXml/itemProps2.xml><?xml version="1.0" encoding="utf-8"?>
-<ds:datastoreItem xmlns:ds="http://schemas.openxmlformats.org/officeDocument/2006/customXml" ds:itemID="{D312BEDD-CD8E-464E-AE20-7BCD0C997533}">
-  <ds:schemaRefs>
-    <ds:schemaRef ds:uri="http://schemas.microsoft.com/sharepoint/v3/contenttype/forms"/>
-  </ds:schemaRefs>
-</ds:datastoreItem>
-</file>
-
-<file path=customXml/itemProps3.xml><?xml version="1.0" encoding="utf-8"?>
 <ds:datastoreItem xmlns:ds="http://schemas.openxmlformats.org/officeDocument/2006/customXml" ds:itemID="{C8EB68D2-3737-4D90-804A-6B964CF8EB88}">
   <ds:schemaRefs>
     <ds:schemaRef ds:uri="http://purl.org/dc/elements/1.1/"/>
@@ -27456,6 +27429,14 @@
 </ds:datastoreItem>
 </file>
 
+<file path=customXml/itemProps3.xml><?xml version="1.0" encoding="utf-8"?>
+<ds:datastoreItem xmlns:ds="http://schemas.openxmlformats.org/officeDocument/2006/customXml" ds:itemID="{D312BEDD-CD8E-464E-AE20-7BCD0C997533}">
+  <ds:schemaRefs>
+    <ds:schemaRef ds:uri="http://schemas.microsoft.com/sharepoint/v3/contenttype/forms"/>
+  </ds:schemaRefs>
+</ds:datastoreItem>
+</file>
+
 <file path=docMetadata/LabelInfo.xml><?xml version="1.0" encoding="utf-8"?>
 <clbl:labelList xmlns:clbl="http://schemas.microsoft.com/office/2020/mipLabelMetadata">
   <clbl:label id="{243bd71d-cef7-442d-b37f-3ff10a3e2832}" enabled="0" method="" siteId="{243bd71d-cef7-442d-b37f-3ff10a3e2832}" removed="1"/>

</xml_diff>